<commit_message>
Changes in individual work
</commit_message>
<xml_diff>
--- a/ENGIN_270K_Coaching/Module_1/E270K_Module_1.pptx
+++ b/ENGIN_270K_Coaching/Module_1/E270K_Module_1.pptx
@@ -289,6 +289,11 @@
       </a:defRPr>
     </a:lvl9pPr>
   </p:defaultTextStyle>
+  <p:extLst>
+    <p:ext uri="{EFAFB233-063F-42B5-8137-9DF3F51BA10A}">
+      <p15:sldGuideLst xmlns:p15="http://schemas.microsoft.com/office/powerpoint/2012/main"/>
+    </p:ext>
+  </p:extLst>
 </p:presentation>
 </file>
 
@@ -2738,7 +2743,7 @@
         </p:nvSpPr>
         <p:spPr>
           <a:xfrm>
-            <a:off x="381300" y="685800"/>
+            <a:off x="381000" y="685800"/>
             <a:ext cx="6096000" cy="3429000"/>
           </a:xfrm>
           <a:custGeom>
@@ -22590,7 +22595,13 @@
         <p:nvGraphicFramePr>
           <p:cNvPr id="108" name="Google Shape;108;p20"/>
           <p:cNvGraphicFramePr/>
-          <p:nvPr/>
+          <p:nvPr>
+            <p:extLst>
+              <p:ext uri="{D42A27DB-BD31-4B8C-83A1-F6EECF244321}">
+                <p14:modId xmlns:p14="http://schemas.microsoft.com/office/powerpoint/2010/main" val="1382065176"/>
+              </p:ext>
+            </p:extLst>
+          </p:nvPr>
         </p:nvGraphicFramePr>
         <p:xfrm>
           <a:off x="247388" y="476550"/>
@@ -23017,7 +23028,15 @@
                         </a:spcAft>
                         <a:buNone/>
                       </a:pPr>
-                      <a:endParaRPr sz="1200" dirty="0"/>
+                      <a:r>
+                        <a:rPr lang="es-CL" sz="1050" dirty="0"/>
+                        <a:t>Carlos </a:t>
+                      </a:r>
+                      <a:r>
+                        <a:rPr lang="es-CL" sz="1050" dirty="0" err="1"/>
+                        <a:t>Nunez</a:t>
+                      </a:r>
+                      <a:endParaRPr sz="1050" dirty="0"/>
                     </a:p>
                   </a:txBody>
                   <a:tcPr marL="91425" marR="91425" marT="91425" marB="91425">
@@ -23067,16 +23086,95 @@
                     <a:bodyPr/>
                     <a:lstStyle/>
                     <a:p>
-                      <a:pPr marL="457200" lvl="0" indent="0" algn="l" rtl="0">
+                      <a:pPr marL="628650" lvl="0" indent="-171450" algn="l" rtl="0">
                         <a:spcBef>
                           <a:spcPts val="0"/>
                         </a:spcBef>
                         <a:spcAft>
                           <a:spcPts val="0"/>
                         </a:spcAft>
-                        <a:buNone/>
+                        <a:buFont typeface="Arial" panose="020B0604020202020204" pitchFamily="34" charset="0"/>
+                        <a:buChar char="•"/>
                       </a:pPr>
-                      <a:endParaRPr sz="1200"/>
+                      <a:r>
+                        <a:rPr lang="es-CL" sz="1000" dirty="0" err="1"/>
+                        <a:t>Technical</a:t>
+                      </a:r>
+                      <a:r>
+                        <a:rPr lang="es-CL" sz="1000" dirty="0"/>
+                        <a:t> </a:t>
+                      </a:r>
+                      <a:r>
+                        <a:rPr lang="es-CL" sz="1000" dirty="0" err="1"/>
+                        <a:t>Expertise</a:t>
+                      </a:r>
+                      <a:r>
+                        <a:rPr lang="es-CL" sz="1000" dirty="0"/>
+                        <a:t> (Python </a:t>
+                      </a:r>
+                      <a:r>
+                        <a:rPr lang="es-CL" sz="1000" dirty="0" err="1"/>
+                        <a:t>Programming</a:t>
+                      </a:r>
+                      <a:r>
+                        <a:rPr lang="es-CL" sz="1000" dirty="0"/>
+                        <a:t>)</a:t>
+                      </a:r>
+                    </a:p>
+                    <a:p>
+                      <a:pPr marL="628650" lvl="0" indent="-171450" algn="l" rtl="0">
+                        <a:spcBef>
+                          <a:spcPts val="0"/>
+                        </a:spcBef>
+                        <a:spcAft>
+                          <a:spcPts val="0"/>
+                        </a:spcAft>
+                        <a:buFont typeface="Arial" panose="020B0604020202020204" pitchFamily="34" charset="0"/>
+                        <a:buChar char="•"/>
+                      </a:pPr>
+                      <a:r>
+                        <a:rPr lang="es-CL" sz="1000" dirty="0" err="1"/>
+                        <a:t>Analytical</a:t>
+                      </a:r>
+                      <a:r>
+                        <a:rPr lang="es-CL" sz="1000" dirty="0"/>
+                        <a:t> </a:t>
+                      </a:r>
+                      <a:r>
+                        <a:rPr lang="es-CL" sz="1000" dirty="0" err="1"/>
+                        <a:t>Thinking</a:t>
+                      </a:r>
+                      <a:endParaRPr lang="es-CL" sz="1000" dirty="0"/>
+                    </a:p>
+                    <a:p>
+                      <a:pPr marL="628650" lvl="0" indent="-171450" algn="l" rtl="0">
+                        <a:spcBef>
+                          <a:spcPts val="0"/>
+                        </a:spcBef>
+                        <a:spcAft>
+                          <a:spcPts val="0"/>
+                        </a:spcAft>
+                        <a:buFont typeface="Arial" panose="020B0604020202020204" pitchFamily="34" charset="0"/>
+                        <a:buChar char="•"/>
+                      </a:pPr>
+                      <a:r>
+                        <a:rPr lang="es-CL" sz="1000" dirty="0" err="1"/>
+                        <a:t>Curiosity</a:t>
+                      </a:r>
+                      <a:endParaRPr lang="es-CL" sz="1000" dirty="0"/>
+                    </a:p>
+                    <a:p>
+                      <a:pPr marL="628650" lvl="0" indent="-171450" algn="l" rtl="0">
+                        <a:spcBef>
+                          <a:spcPts val="0"/>
+                        </a:spcBef>
+                        <a:spcAft>
+                          <a:spcPts val="0"/>
+                        </a:spcAft>
+                        <a:buFont typeface="Arial" panose="020B0604020202020204" pitchFamily="34" charset="0"/>
+                        <a:buChar char="•"/>
+                      </a:pPr>
+                      <a:endParaRPr sz="1200" dirty="0"/>
                     </a:p>
                   </a:txBody>
                   <a:tcPr marL="91425" marR="91425" marT="91425" marB="91425">
@@ -23126,16 +23224,269 @@
                     <a:bodyPr/>
                     <a:lstStyle/>
                     <a:p>
-                      <a:pPr marL="457200" lvl="0" indent="0" algn="l" rtl="0">
+                      <a:pPr marL="742950" lvl="0" indent="-285750" algn="l" rtl="0">
                         <a:spcBef>
                           <a:spcPts val="0"/>
                         </a:spcBef>
                         <a:spcAft>
                           <a:spcPts val="0"/>
                         </a:spcAft>
-                        <a:buNone/>
+                        <a:buFont typeface="Arial" panose="020B0604020202020204" pitchFamily="34" charset="0"/>
+                        <a:buChar char="•"/>
                       </a:pPr>
-                      <a:endParaRPr/>
+                      <a:r>
+                        <a:rPr lang="es-CL" sz="1000" dirty="0" err="1"/>
+                        <a:t>Communication</a:t>
+                      </a:r>
+                      <a:r>
+                        <a:rPr lang="es-CL" sz="1000" dirty="0"/>
+                        <a:t> (</a:t>
+                      </a:r>
+                      <a:r>
+                        <a:rPr lang="es-CL" sz="1000" dirty="0" err="1"/>
+                        <a:t>Sharing</a:t>
+                      </a:r>
+                      <a:r>
+                        <a:rPr lang="es-CL" sz="1000" dirty="0"/>
+                        <a:t> </a:t>
+                      </a:r>
+                      <a:r>
+                        <a:rPr lang="es-CL" sz="1000" dirty="0" err="1"/>
+                        <a:t>progress</a:t>
+                      </a:r>
+                      <a:r>
+                        <a:rPr lang="es-CL" sz="1000" dirty="0"/>
+                        <a:t> and </a:t>
+                      </a:r>
+                      <a:r>
+                        <a:rPr lang="es-CL" sz="1000" dirty="0" err="1"/>
+                        <a:t>dificulties</a:t>
+                      </a:r>
+                      <a:r>
+                        <a:rPr lang="es-CL" sz="1000" dirty="0"/>
+                        <a:t>)</a:t>
+                      </a:r>
+                    </a:p>
+                    <a:p>
+                      <a:pPr marL="742950" lvl="0" indent="-285750" algn="l" rtl="0">
+                        <a:spcBef>
+                          <a:spcPts val="0"/>
+                        </a:spcBef>
+                        <a:spcAft>
+                          <a:spcPts val="0"/>
+                        </a:spcAft>
+                        <a:buFont typeface="Arial" panose="020B0604020202020204" pitchFamily="34" charset="0"/>
+                        <a:buChar char="•"/>
+                      </a:pPr>
+                      <a:r>
+                        <a:rPr lang="es-CL" sz="1000" dirty="0" err="1"/>
+                        <a:t>Productivity</a:t>
+                      </a:r>
+                      <a:r>
+                        <a:rPr lang="es-CL" sz="1000" dirty="0"/>
+                        <a:t> (</a:t>
+                      </a:r>
+                      <a:r>
+                        <a:rPr lang="es-CL" sz="1000" dirty="0" err="1"/>
+                        <a:t>Losing</a:t>
+                      </a:r>
+                      <a:r>
+                        <a:rPr lang="es-CL" sz="1000" dirty="0"/>
+                        <a:t> a </a:t>
+                      </a:r>
+                      <a:r>
+                        <a:rPr lang="es-CL" sz="1000" dirty="0" err="1"/>
+                        <a:t>lot</a:t>
+                      </a:r>
+                      <a:r>
+                        <a:rPr lang="es-CL" sz="1000" dirty="0"/>
+                        <a:t> </a:t>
+                      </a:r>
+                      <a:r>
+                        <a:rPr lang="es-CL" sz="1000" dirty="0" err="1"/>
+                        <a:t>of</a:t>
+                      </a:r>
+                      <a:r>
+                        <a:rPr lang="es-CL" sz="1000" dirty="0"/>
+                        <a:t> time in trivial </a:t>
+                      </a:r>
+                      <a:r>
+                        <a:rPr lang="es-CL" sz="1000" dirty="0" err="1"/>
+                        <a:t>aspects</a:t>
+                      </a:r>
+                      <a:r>
+                        <a:rPr lang="es-CL" sz="1000" dirty="0"/>
+                        <a:t> </a:t>
+                      </a:r>
+                      <a:r>
+                        <a:rPr lang="es-CL" sz="1000" dirty="0" err="1"/>
+                        <a:t>of</a:t>
+                      </a:r>
+                      <a:r>
+                        <a:rPr lang="es-CL" sz="1000" dirty="0"/>
+                        <a:t> </a:t>
+                      </a:r>
+                      <a:r>
+                        <a:rPr lang="es-CL" sz="1000" dirty="0" err="1"/>
+                        <a:t>the</a:t>
+                      </a:r>
+                      <a:r>
+                        <a:rPr lang="es-CL" sz="1000" dirty="0"/>
+                        <a:t> </a:t>
+                      </a:r>
+                      <a:r>
+                        <a:rPr lang="es-CL" sz="1000" dirty="0" err="1"/>
+                        <a:t>models</a:t>
+                      </a:r>
+                      <a:r>
+                        <a:rPr lang="es-CL" sz="1000" dirty="0"/>
+                        <a:t> </a:t>
+                      </a:r>
+                      <a:r>
+                        <a:rPr lang="es-CL" sz="1000" dirty="0" err="1"/>
+                        <a:t>developed</a:t>
+                      </a:r>
+                      <a:r>
+                        <a:rPr lang="es-CL" sz="1000" dirty="0"/>
+                        <a:t>).</a:t>
+                      </a:r>
+                    </a:p>
+                    <a:p>
+                      <a:pPr marL="742950" lvl="0" indent="-285750" algn="l" rtl="0">
+                        <a:spcBef>
+                          <a:spcPts val="0"/>
+                        </a:spcBef>
+                        <a:spcAft>
+                          <a:spcPts val="0"/>
+                        </a:spcAft>
+                        <a:buFont typeface="Arial" panose="020B0604020202020204" pitchFamily="34" charset="0"/>
+                        <a:buChar char="•"/>
+                      </a:pPr>
+                      <a:r>
+                        <a:rPr lang="es-CL" sz="1000" dirty="0" err="1"/>
+                        <a:t>Team-work</a:t>
+                      </a:r>
+                      <a:r>
+                        <a:rPr lang="es-CL" sz="1000" dirty="0"/>
+                        <a:t> (</a:t>
+                      </a:r>
+                      <a:r>
+                        <a:rPr lang="es-CL" sz="1000" dirty="0" err="1"/>
+                        <a:t>It</a:t>
+                      </a:r>
+                      <a:r>
+                        <a:rPr lang="es-CL" sz="1000" dirty="0"/>
+                        <a:t> </a:t>
+                      </a:r>
+                      <a:r>
+                        <a:rPr lang="es-CL" sz="1000" dirty="0" err="1"/>
+                        <a:t>is</a:t>
+                      </a:r>
+                      <a:r>
+                        <a:rPr lang="es-CL" sz="1000" dirty="0"/>
+                        <a:t> </a:t>
+                      </a:r>
+                      <a:r>
+                        <a:rPr lang="es-CL" sz="1000" dirty="0" err="1"/>
+                        <a:t>hard</a:t>
+                      </a:r>
+                      <a:r>
+                        <a:rPr lang="es-CL" sz="1000" dirty="0"/>
+                        <a:t> </a:t>
+                      </a:r>
+                      <a:r>
+                        <a:rPr lang="es-CL" sz="1000" dirty="0" err="1"/>
+                        <a:t>to</a:t>
+                      </a:r>
+                      <a:r>
+                        <a:rPr lang="es-CL" sz="1000" dirty="0"/>
+                        <a:t> </a:t>
+                      </a:r>
+                      <a:r>
+                        <a:rPr lang="es-CL" sz="1000" dirty="0" err="1"/>
+                        <a:t>make</a:t>
+                      </a:r>
+                      <a:r>
+                        <a:rPr lang="es-CL" sz="1000" dirty="0"/>
+                        <a:t> </a:t>
+                      </a:r>
+                      <a:r>
+                        <a:rPr lang="es-CL" sz="1000" dirty="0" err="1"/>
+                        <a:t>it</a:t>
+                      </a:r>
+                      <a:r>
+                        <a:rPr lang="es-CL" sz="1000" dirty="0"/>
+                        <a:t> </a:t>
+                      </a:r>
+                      <a:r>
+                        <a:rPr lang="es-CL" sz="1000" dirty="0" err="1"/>
+                        <a:t>collaboratively</a:t>
+                      </a:r>
+                      <a:r>
+                        <a:rPr lang="es-CL" sz="1000" dirty="0"/>
+                        <a:t> </a:t>
+                      </a:r>
+                      <a:r>
+                        <a:rPr lang="es-CL" sz="1000" dirty="0" err="1"/>
+                        <a:t>sice</a:t>
+                      </a:r>
+                      <a:r>
+                        <a:rPr lang="es-CL" sz="1000" dirty="0"/>
+                        <a:t> </a:t>
+                      </a:r>
+                      <a:r>
+                        <a:rPr lang="es-CL" sz="1000" dirty="0" err="1"/>
+                        <a:t>the</a:t>
+                      </a:r>
+                      <a:r>
+                        <a:rPr lang="es-CL" sz="1000" dirty="0"/>
+                        <a:t> </a:t>
+                      </a:r>
+                      <a:r>
+                        <a:rPr lang="es-CL" sz="1000" dirty="0" err="1"/>
+                        <a:t>main</a:t>
+                      </a:r>
+                      <a:r>
+                        <a:rPr lang="es-CL" sz="1000" dirty="0"/>
+                        <a:t> </a:t>
+                      </a:r>
+                      <a:r>
+                        <a:rPr lang="es-CL" sz="1000" dirty="0" err="1"/>
+                        <a:t>activities</a:t>
+                      </a:r>
+                      <a:r>
+                        <a:rPr lang="es-CL" sz="1000" dirty="0"/>
+                        <a:t> are </a:t>
+                      </a:r>
+                      <a:r>
+                        <a:rPr lang="es-CL" sz="1000" dirty="0" err="1"/>
+                        <a:t>about</a:t>
+                      </a:r>
+                      <a:r>
+                        <a:rPr lang="es-CL" sz="1000" dirty="0"/>
+                        <a:t> </a:t>
+                      </a:r>
+                      <a:r>
+                        <a:rPr lang="es-CL" sz="1000" dirty="0" err="1"/>
+                        <a:t>coding</a:t>
+                      </a:r>
+                      <a:r>
+                        <a:rPr lang="es-CL" sz="1000" dirty="0"/>
+                        <a:t>).</a:t>
+                      </a:r>
+                    </a:p>
+                    <a:p>
+                      <a:pPr marL="742950" lvl="0" indent="-285750" algn="l" rtl="0">
+                        <a:spcBef>
+                          <a:spcPts val="0"/>
+                        </a:spcBef>
+                        <a:spcAft>
+                          <a:spcPts val="0"/>
+                        </a:spcAft>
+                        <a:buFont typeface="Arial" panose="020B0604020202020204" pitchFamily="34" charset="0"/>
+                        <a:buChar char="•"/>
+                      </a:pPr>
+                      <a:endParaRPr sz="1000" dirty="0"/>
                     </a:p>
                   </a:txBody>
                   <a:tcPr marL="91425" marR="91425" marT="91425" marB="91425">
@@ -23185,16 +23536,205 @@
                     <a:bodyPr/>
                     <a:lstStyle/>
                     <a:p>
-                      <a:pPr marL="0" lvl="0" indent="0" algn="l" rtl="0">
+                      <a:pPr marL="171450" lvl="0" indent="-171450" algn="l" rtl="0">
                         <a:spcBef>
                           <a:spcPts val="0"/>
                         </a:spcBef>
                         <a:spcAft>
                           <a:spcPts val="0"/>
                         </a:spcAft>
-                        <a:buNone/>
+                        <a:buFont typeface="Arial" panose="020B0604020202020204" pitchFamily="34" charset="0"/>
+                        <a:buChar char="•"/>
                       </a:pPr>
-                      <a:endParaRPr sz="1200"/>
+                      <a:r>
+                        <a:rPr lang="es-CL" sz="1000" dirty="0" err="1"/>
+                        <a:t>Make</a:t>
+                      </a:r>
+                      <a:r>
+                        <a:rPr lang="es-CL" sz="1000" dirty="0"/>
+                        <a:t> </a:t>
+                      </a:r>
+                      <a:r>
+                        <a:rPr lang="es-CL" sz="1000" dirty="0" err="1"/>
+                        <a:t>sure</a:t>
+                      </a:r>
+                      <a:r>
+                        <a:rPr lang="es-CL" sz="1000" dirty="0"/>
+                        <a:t> </a:t>
+                      </a:r>
+                      <a:r>
+                        <a:rPr lang="es-CL" sz="1000" dirty="0" err="1"/>
+                        <a:t>each</a:t>
+                      </a:r>
+                      <a:r>
+                        <a:rPr lang="es-CL" sz="1000" dirty="0"/>
+                        <a:t> line </a:t>
+                      </a:r>
+                      <a:r>
+                        <a:rPr lang="es-CL" sz="1000" dirty="0" err="1"/>
+                        <a:t>of</a:t>
+                      </a:r>
+                      <a:r>
+                        <a:rPr lang="es-CL" sz="1000" dirty="0"/>
+                        <a:t> </a:t>
+                      </a:r>
+                      <a:r>
+                        <a:rPr lang="es-CL" sz="1000" dirty="0" err="1"/>
+                        <a:t>my</a:t>
+                      </a:r>
+                      <a:r>
+                        <a:rPr lang="es-CL" sz="1000" dirty="0"/>
+                        <a:t> </a:t>
+                      </a:r>
+                      <a:r>
+                        <a:rPr lang="es-CL" sz="1000" dirty="0" err="1"/>
+                        <a:t>code</a:t>
+                      </a:r>
+                      <a:r>
+                        <a:rPr lang="es-CL" sz="1000" dirty="0"/>
+                        <a:t> has </a:t>
+                      </a:r>
+                      <a:r>
+                        <a:rPr lang="es-CL" sz="1000" dirty="0" err="1"/>
+                        <a:t>an</a:t>
+                      </a:r>
+                      <a:r>
+                        <a:rPr lang="es-CL" sz="1000" dirty="0"/>
+                        <a:t> </a:t>
+                      </a:r>
+                      <a:r>
+                        <a:rPr lang="es-CL" sz="1000" dirty="0" err="1"/>
+                        <a:t>explanation</a:t>
+                      </a:r>
+                      <a:r>
+                        <a:rPr lang="es-CL" sz="1000" dirty="0"/>
+                        <a:t> </a:t>
+                      </a:r>
+                      <a:r>
+                        <a:rPr lang="es-CL" sz="1000" dirty="0" err="1"/>
+                        <a:t>of</a:t>
+                      </a:r>
+                      <a:r>
+                        <a:rPr lang="es-CL" sz="1000" dirty="0"/>
+                        <a:t> </a:t>
+                      </a:r>
+                      <a:r>
+                        <a:rPr lang="es-CL" sz="1000" dirty="0" err="1"/>
+                        <a:t>what</a:t>
+                      </a:r>
+                      <a:r>
+                        <a:rPr lang="es-CL" sz="1000" dirty="0"/>
+                        <a:t> </a:t>
+                      </a:r>
+                      <a:r>
+                        <a:rPr lang="es-CL" sz="1000" dirty="0" err="1"/>
+                        <a:t>it</a:t>
+                      </a:r>
+                      <a:r>
+                        <a:rPr lang="es-CL" sz="1000" dirty="0"/>
+                        <a:t> </a:t>
+                      </a:r>
+                      <a:r>
+                        <a:rPr lang="es-CL" sz="1000" dirty="0" err="1"/>
+                        <a:t>is</a:t>
+                      </a:r>
+                      <a:r>
+                        <a:rPr lang="es-CL" sz="1000" dirty="0"/>
+                        <a:t> </a:t>
+                      </a:r>
+                      <a:r>
+                        <a:rPr lang="es-CL" sz="1000" dirty="0" err="1"/>
+                        <a:t>doing</a:t>
+                      </a:r>
+                      <a:r>
+                        <a:rPr lang="es-CL" sz="1000" dirty="0"/>
+                        <a:t>.</a:t>
+                      </a:r>
+                    </a:p>
+                    <a:p>
+                      <a:pPr marL="171450" lvl="0" indent="-171450" algn="l" rtl="0">
+                        <a:spcBef>
+                          <a:spcPts val="0"/>
+                        </a:spcBef>
+                        <a:spcAft>
+                          <a:spcPts val="0"/>
+                        </a:spcAft>
+                        <a:buFont typeface="Arial" panose="020B0604020202020204" pitchFamily="34" charset="0"/>
+                        <a:buChar char="•"/>
+                      </a:pPr>
+                      <a:r>
+                        <a:rPr lang="es-CL" sz="1000" dirty="0" err="1"/>
+                        <a:t>Communicate</a:t>
+                      </a:r>
+                      <a:r>
+                        <a:rPr lang="es-CL" sz="1000" dirty="0"/>
+                        <a:t> </a:t>
+                      </a:r>
+                      <a:r>
+                        <a:rPr lang="es-CL" sz="1000" dirty="0" err="1"/>
+                        <a:t>each</a:t>
+                      </a:r>
+                      <a:r>
+                        <a:rPr lang="es-CL" sz="1000" dirty="0"/>
+                        <a:t> </a:t>
+                      </a:r>
+                      <a:r>
+                        <a:rPr lang="es-CL" sz="1000" dirty="0" err="1"/>
+                        <a:t>change</a:t>
+                      </a:r>
+                      <a:r>
+                        <a:rPr lang="es-CL" sz="1000" dirty="0"/>
+                        <a:t>/</a:t>
+                      </a:r>
+                      <a:r>
+                        <a:rPr lang="es-CL" sz="1000" dirty="0" err="1"/>
+                        <a:t>finding</a:t>
+                      </a:r>
+                      <a:r>
+                        <a:rPr lang="es-CL" sz="1000" dirty="0"/>
+                        <a:t> in </a:t>
+                      </a:r>
+                      <a:r>
+                        <a:rPr lang="es-CL" sz="1000" dirty="0" err="1"/>
+                        <a:t>my</a:t>
+                      </a:r>
+                      <a:r>
+                        <a:rPr lang="es-CL" sz="1000" dirty="0"/>
+                        <a:t> </a:t>
+                      </a:r>
+                      <a:r>
+                        <a:rPr lang="es-CL" sz="1000" dirty="0" err="1"/>
+                        <a:t>research</a:t>
+                      </a:r>
+                      <a:r>
+                        <a:rPr lang="es-CL" sz="1000" dirty="0"/>
+                        <a:t> </a:t>
+                      </a:r>
+                      <a:r>
+                        <a:rPr lang="es-CL" sz="1000" dirty="0" err="1"/>
+                        <a:t>or</a:t>
+                      </a:r>
+                      <a:r>
+                        <a:rPr lang="es-CL" sz="1000" dirty="0"/>
+                        <a:t> </a:t>
+                      </a:r>
+                      <a:r>
+                        <a:rPr lang="es-CL" sz="1000" dirty="0" err="1"/>
+                        <a:t>coding</a:t>
+                      </a:r>
+                      <a:r>
+                        <a:rPr lang="es-CL" sz="1000" dirty="0"/>
+                        <a:t> </a:t>
+                      </a:r>
+                      <a:r>
+                        <a:rPr lang="es-CL" sz="1000" dirty="0" err="1"/>
+                        <a:t>activity</a:t>
+                      </a:r>
+                      <a:r>
+                        <a:rPr lang="es-CL" sz="1000" dirty="0"/>
+                        <a:t>.</a:t>
+                      </a:r>
+                      <a:endParaRPr sz="900" dirty="0"/>
                     </a:p>
                   </a:txBody>
                   <a:tcPr marL="91425" marR="91425" marT="91425" marB="91425">
@@ -23244,16 +23784,213 @@
                     <a:bodyPr/>
                     <a:lstStyle/>
                     <a:p>
-                      <a:pPr marL="0" lvl="0" indent="0" algn="l" rtl="0">
+                      <a:pPr marL="171450" lvl="0" indent="-171450" algn="l" rtl="0">
                         <a:spcBef>
                           <a:spcPts val="0"/>
                         </a:spcBef>
                         <a:spcAft>
                           <a:spcPts val="0"/>
                         </a:spcAft>
-                        <a:buNone/>
+                        <a:buFont typeface="Arial" panose="020B0604020202020204" pitchFamily="34" charset="0"/>
+                        <a:buChar char="•"/>
                       </a:pPr>
-                      <a:endParaRPr sz="1200" dirty="0">
+                      <a:r>
+                        <a:rPr lang="es-CL" sz="1000" dirty="0">
+                          <a:solidFill>
+                            <a:schemeClr val="dk1"/>
+                          </a:solidFill>
+                        </a:rPr>
+                        <a:t>% </a:t>
+                      </a:r>
+                      <a:r>
+                        <a:rPr lang="es-CL" sz="1000" dirty="0" err="1">
+                          <a:solidFill>
+                            <a:schemeClr val="dk1"/>
+                          </a:solidFill>
+                        </a:rPr>
+                        <a:t>of</a:t>
+                      </a:r>
+                      <a:r>
+                        <a:rPr lang="es-CL" sz="1000" dirty="0">
+                          <a:solidFill>
+                            <a:schemeClr val="dk1"/>
+                          </a:solidFill>
+                        </a:rPr>
+                        <a:t> </a:t>
+                      </a:r>
+                      <a:r>
+                        <a:rPr lang="es-CL" sz="1000" dirty="0" err="1">
+                          <a:solidFill>
+                            <a:schemeClr val="dk1"/>
+                          </a:solidFill>
+                        </a:rPr>
+                        <a:t>lines</a:t>
+                      </a:r>
+                      <a:r>
+                        <a:rPr lang="es-CL" sz="1000" dirty="0">
+                          <a:solidFill>
+                            <a:schemeClr val="dk1"/>
+                          </a:solidFill>
+                        </a:rPr>
+                        <a:t> </a:t>
+                      </a:r>
+                      <a:r>
+                        <a:rPr lang="es-CL" sz="1000" dirty="0" err="1">
+                          <a:solidFill>
+                            <a:schemeClr val="dk1"/>
+                          </a:solidFill>
+                        </a:rPr>
+                        <a:t>with</a:t>
+                      </a:r>
+                      <a:r>
+                        <a:rPr lang="es-CL" sz="1000" dirty="0">
+                          <a:solidFill>
+                            <a:schemeClr val="dk1"/>
+                          </a:solidFill>
+                        </a:rPr>
+                        <a:t> </a:t>
+                      </a:r>
+                      <a:r>
+                        <a:rPr lang="es-CL" sz="1000" dirty="0" err="1">
+                          <a:solidFill>
+                            <a:schemeClr val="dk1"/>
+                          </a:solidFill>
+                        </a:rPr>
+                        <a:t>an</a:t>
+                      </a:r>
+                      <a:r>
+                        <a:rPr lang="es-CL" sz="1000" dirty="0">
+                          <a:solidFill>
+                            <a:schemeClr val="dk1"/>
+                          </a:solidFill>
+                        </a:rPr>
+                        <a:t> </a:t>
+                      </a:r>
+                      <a:r>
+                        <a:rPr lang="es-CL" sz="1000" dirty="0" err="1">
+                          <a:solidFill>
+                            <a:schemeClr val="dk1"/>
+                          </a:solidFill>
+                        </a:rPr>
+                        <a:t>explanation</a:t>
+                      </a:r>
+                      <a:r>
+                        <a:rPr lang="es-CL" sz="1000" dirty="0">
+                          <a:solidFill>
+                            <a:schemeClr val="dk1"/>
+                          </a:solidFill>
+                        </a:rPr>
+                        <a:t>.</a:t>
+                      </a:r>
+                    </a:p>
+                    <a:p>
+                      <a:pPr marL="171450" lvl="0" indent="-171450" algn="l" rtl="0">
+                        <a:spcBef>
+                          <a:spcPts val="0"/>
+                        </a:spcBef>
+                        <a:spcAft>
+                          <a:spcPts val="0"/>
+                        </a:spcAft>
+                        <a:buFont typeface="Arial" panose="020B0604020202020204" pitchFamily="34" charset="0"/>
+                        <a:buChar char="•"/>
+                      </a:pPr>
+                      <a:r>
+                        <a:rPr lang="es-CL" sz="1000" dirty="0" err="1">
+                          <a:solidFill>
+                            <a:schemeClr val="dk1"/>
+                          </a:solidFill>
+                        </a:rPr>
+                        <a:t>Team</a:t>
+                      </a:r>
+                      <a:r>
+                        <a:rPr lang="es-CL" sz="1000" dirty="0">
+                          <a:solidFill>
+                            <a:schemeClr val="dk1"/>
+                          </a:solidFill>
+                        </a:rPr>
+                        <a:t> </a:t>
+                      </a:r>
+                      <a:r>
+                        <a:rPr lang="es-CL" sz="1000" dirty="0" err="1">
+                          <a:solidFill>
+                            <a:schemeClr val="dk1"/>
+                          </a:solidFill>
+                        </a:rPr>
+                        <a:t>happiness</a:t>
+                      </a:r>
+                      <a:r>
+                        <a:rPr lang="es-CL" sz="1000" dirty="0">
+                          <a:solidFill>
+                            <a:schemeClr val="dk1"/>
+                          </a:solidFill>
+                        </a:rPr>
+                        <a:t>/</a:t>
+                      </a:r>
+                      <a:r>
+                        <a:rPr lang="es-CL" sz="1000" dirty="0" err="1">
+                          <a:solidFill>
+                            <a:schemeClr val="dk1"/>
+                          </a:solidFill>
+                        </a:rPr>
+                        <a:t>involvement</a:t>
+                      </a:r>
+                      <a:r>
+                        <a:rPr lang="es-CL" sz="1000" dirty="0">
+                          <a:solidFill>
+                            <a:schemeClr val="dk1"/>
+                          </a:solidFill>
+                        </a:rPr>
+                        <a:t> (</a:t>
+                      </a:r>
+                      <a:r>
+                        <a:rPr lang="es-CL" sz="1000" dirty="0" err="1">
+                          <a:solidFill>
+                            <a:schemeClr val="dk1"/>
+                          </a:solidFill>
+                        </a:rPr>
+                        <a:t>Rated</a:t>
+                      </a:r>
+                      <a:r>
+                        <a:rPr lang="es-CL" sz="1000" dirty="0">
+                          <a:solidFill>
+                            <a:schemeClr val="dk1"/>
+                          </a:solidFill>
+                        </a:rPr>
+                        <a:t> </a:t>
+                      </a:r>
+                      <a:r>
+                        <a:rPr lang="es-CL" sz="1000" dirty="0" err="1">
+                          <a:solidFill>
+                            <a:schemeClr val="dk1"/>
+                          </a:solidFill>
+                        </a:rPr>
+                        <a:t>from</a:t>
+                      </a:r>
+                      <a:r>
+                        <a:rPr lang="es-CL" sz="1000" dirty="0">
+                          <a:solidFill>
+                            <a:schemeClr val="dk1"/>
+                          </a:solidFill>
+                        </a:rPr>
+                        <a:t> 1 </a:t>
+                      </a:r>
+                      <a:r>
+                        <a:rPr lang="es-CL" sz="1000" dirty="0" err="1">
+                          <a:solidFill>
+                            <a:schemeClr val="dk1"/>
+                          </a:solidFill>
+                        </a:rPr>
+                        <a:t>to</a:t>
+                      </a:r>
+                      <a:r>
+                        <a:rPr lang="es-CL" sz="1000">
+                          <a:solidFill>
+                            <a:schemeClr val="dk1"/>
+                          </a:solidFill>
+                        </a:rPr>
+                        <a:t> 5).</a:t>
+                      </a:r>
+                      <a:endParaRPr sz="1000" dirty="0">
                         <a:solidFill>
                           <a:schemeClr val="dk1"/>
                         </a:solidFill>
@@ -23743,7 +24480,7 @@
                         </a:spcAft>
                         <a:buNone/>
                       </a:pPr>
-                      <a:endParaRPr/>
+                      <a:endParaRPr dirty="0"/>
                     </a:p>
                   </a:txBody>
                   <a:tcPr marL="91425" marR="91425" marT="91425" marB="91425">
@@ -23802,7 +24539,7 @@
                         </a:spcAft>
                         <a:buNone/>
                       </a:pPr>
-                      <a:endParaRPr/>
+                      <a:endParaRPr dirty="0"/>
                     </a:p>
                   </a:txBody>
                   <a:tcPr marL="91425" marR="91425" marT="91425" marB="91425">
@@ -23861,7 +24598,7 @@
                         </a:spcAft>
                         <a:buNone/>
                       </a:pPr>
-                      <a:endParaRPr/>
+                      <a:endParaRPr dirty="0"/>
                     </a:p>
                   </a:txBody>
                   <a:tcPr marL="91425" marR="91425" marT="91425" marB="91425">
@@ -23920,7 +24657,7 @@
                         </a:spcAft>
                         <a:buNone/>
                       </a:pPr>
-                      <a:endParaRPr sz="1200"/>
+                      <a:endParaRPr sz="1200" dirty="0"/>
                     </a:p>
                   </a:txBody>
                   <a:tcPr marL="91425" marR="91425" marT="91425" marB="91425">
@@ -23979,7 +24716,7 @@
                         </a:spcAft>
                         <a:buNone/>
                       </a:pPr>
-                      <a:endParaRPr sz="1200">
+                      <a:endParaRPr sz="1200" dirty="0">
                         <a:solidFill>
                           <a:schemeClr val="dk1"/>
                         </a:solidFill>

</xml_diff>